<commit_message>
thêm link github vào file ppt
</commit_message>
<xml_diff>
--- a/PowerPoint, Video bao cao/QuanLyHocVienTrungTamNgoaiNgu.pptx
+++ b/PowerPoint, Video bao cao/QuanLyHocVienTrungTamNgoaiNgu.pptx
@@ -41199,13 +41199,13 @@
           <p:nvPr>
             <p:extLst>
               <p:ext uri="{D42A27DB-BD31-4B8C-83A1-F6EECF244321}">
-                <p14:modId xmlns:p14="http://schemas.microsoft.com/office/powerpoint/2010/main" val="1549693856"/>
+                <p14:modId xmlns:p14="http://schemas.microsoft.com/office/powerpoint/2010/main" val="4048903247"/>
               </p:ext>
             </p:extLst>
           </p:nvPr>
         </p:nvGraphicFramePr>
         <p:xfrm>
-          <a:off x="2208981" y="2872740"/>
+          <a:off x="2032000" y="1437230"/>
           <a:ext cx="8127999" cy="1833880"/>
         </p:xfrm>
         <a:graphic>
@@ -41379,6 +41379,41 @@
           </a:graphicData>
         </a:graphic>
       </p:graphicFrame>
+      <p:sp>
+        <p:nvSpPr>
+          <p:cNvPr id="2" name="TextBox 1">
+            <a:extLst>
+              <a:ext uri="{FF2B5EF4-FFF2-40B4-BE49-F238E27FC236}">
+                <a16:creationId xmlns:a16="http://schemas.microsoft.com/office/drawing/2014/main" id="{B1321445-AE68-1E00-724E-B776CB8A19BF}"/>
+              </a:ext>
+            </a:extLst>
+          </p:cNvPr>
+          <p:cNvSpPr txBox="1"/>
+          <p:nvPr/>
+        </p:nvSpPr>
+        <p:spPr>
+          <a:xfrm>
+            <a:off x="3362632" y="4385187"/>
+            <a:ext cx="5908990" cy="307777"/>
+          </a:xfrm>
+          <a:prstGeom prst="rect">
+            <a:avLst/>
+          </a:prstGeom>
+          <a:noFill/>
+        </p:spPr>
+        <p:txBody>
+          <a:bodyPr wrap="none" rtlCol="0">
+            <a:spAutoFit/>
+          </a:bodyPr>
+          <a:lstStyle/>
+          <a:p>
+            <a:r>
+              <a:rPr lang="en-US" dirty="0"/>
+              <a:t>Link GITHUB: https://github.com/tmyngn/TieuLuanCuoiKy_NMCNPM.git</a:t>
+            </a:r>
+          </a:p>
+        </p:txBody>
+      </p:sp>
     </p:spTree>
   </p:cSld>
   <p:clrMapOvr>

</xml_diff>